<commit_message>
Updates to book data for pitch presentation
Started the background information
</commit_message>
<xml_diff>
--- a/PitchPresentationACRSent.pptx
+++ b/PitchPresentationACRSent.pptx
@@ -6,12 +6,14 @@
   </p:sldMasterIdLst>
   <p:sldIdLst>
     <p:sldId id="256" r:id="rId2"/>
-    <p:sldId id="257" r:id="rId3"/>
-    <p:sldId id="258" r:id="rId4"/>
-    <p:sldId id="259" r:id="rId5"/>
-    <p:sldId id="260" r:id="rId6"/>
-    <p:sldId id="261" r:id="rId7"/>
-    <p:sldId id="263" r:id="rId8"/>
+    <p:sldId id="265" r:id="rId3"/>
+    <p:sldId id="257" r:id="rId4"/>
+    <p:sldId id="258" r:id="rId5"/>
+    <p:sldId id="259" r:id="rId6"/>
+    <p:sldId id="264" r:id="rId7"/>
+    <p:sldId id="260" r:id="rId8"/>
+    <p:sldId id="261" r:id="rId9"/>
+    <p:sldId id="263" r:id="rId10"/>
   </p:sldIdLst>
   <p:sldSz cx="12192000" cy="6858000"/>
   <p:notesSz cx="6858000" cy="9144000"/>
@@ -4507,9 +4509,16 @@
             <p:ph type="ctrTitle"/>
           </p:nvPr>
         </p:nvSpPr>
-        <p:spPr/>
-        <p:txBody>
-          <a:bodyPr/>
+        <p:spPr>
+          <a:xfrm>
+            <a:off x="2013994" y="3093333"/>
+            <a:ext cx="6115880" cy="2268559"/>
+          </a:xfrm>
+        </p:spPr>
+        <p:txBody>
+          <a:bodyPr>
+            <a:normAutofit fontScale="90000"/>
+          </a:bodyPr>
           <a:lstStyle/>
           <a:p>
             <a:r>
@@ -4518,8 +4527,16 @@
             </a:r>
             <a:r>
               <a:rPr lang="en-US" dirty="0"/>
-              <a:t> Pitch Presentation</a:t>
-            </a:r>
+              <a:t> Pitch Presentation:</a:t>
+            </a:r>
+            <a:br>
+              <a:rPr lang="en-US" dirty="0"/>
+            </a:br>
+            <a:r>
+              <a:rPr lang="en-US" sz="2700" dirty="0"/>
+              <a:t>Sentiment Analysis of Amazon Reviews</a:t>
+            </a:r>
+            <a:endParaRPr lang="en-US" dirty="0"/>
           </a:p>
         </p:txBody>
       </p:sp>
@@ -4539,7 +4556,12 @@
             <p:ph type="subTitle" idx="1"/>
           </p:nvPr>
         </p:nvSpPr>
-        <p:spPr/>
+        <p:spPr>
+          <a:xfrm>
+            <a:off x="2772274" y="1933120"/>
+            <a:ext cx="5357600" cy="1160213"/>
+          </a:xfrm>
+        </p:spPr>
         <p:txBody>
           <a:bodyPr/>
           <a:lstStyle/>
@@ -4599,7 +4621,7 @@
           <p:cNvPr id="2" name="Title 1">
             <a:extLst>
               <a:ext uri="{FF2B5EF4-FFF2-40B4-BE49-F238E27FC236}">
-                <a16:creationId xmlns:a16="http://schemas.microsoft.com/office/drawing/2014/main" id="{EAC65094-1AD8-784A-9361-19962014DD09}"/>
+                <a16:creationId xmlns:a16="http://schemas.microsoft.com/office/drawing/2014/main" id="{8C363138-0BB6-1A49-A30B-E3D5384A3351}"/>
               </a:ext>
             </a:extLst>
           </p:cNvPr>
@@ -4617,14 +4639,7 @@
           <a:p>
             <a:r>
               <a:rPr lang="en-US" dirty="0"/>
-              <a:t>Book Cleaning– </a:t>
-            </a:r>
-            <a:br>
-              <a:rPr lang="en-US" dirty="0"/>
-            </a:br>
-            <a:r>
-              <a:rPr lang="en-US" dirty="0"/>
-              <a:t>First Pass</a:t>
+              <a:t>Background</a:t>
             </a:r>
           </a:p>
         </p:txBody>
@@ -4634,7 +4649,7 @@
           <p:cNvPr id="3" name="Content Placeholder 2">
             <a:extLst>
               <a:ext uri="{FF2B5EF4-FFF2-40B4-BE49-F238E27FC236}">
-                <a16:creationId xmlns:a16="http://schemas.microsoft.com/office/drawing/2014/main" id="{D9E30147-D50E-9845-AF83-48FDD3D2471F}"/>
+                <a16:creationId xmlns:a16="http://schemas.microsoft.com/office/drawing/2014/main" id="{21450679-005C-C146-A17F-FDBA41AB5E7C}"/>
               </a:ext>
             </a:extLst>
           </p:cNvPr>
@@ -4647,64 +4662,18 @@
         </p:nvSpPr>
         <p:spPr/>
         <p:txBody>
-          <a:bodyPr>
-            <a:normAutofit fontScale="92500" lnSpcReduction="20000"/>
-          </a:bodyPr>
-          <a:lstStyle/>
-          <a:p>
-            <a:r>
-              <a:rPr lang="en-US" dirty="0"/>
-              <a:t>Remove rows with </a:t>
-            </a:r>
-            <a:r>
-              <a:rPr lang="en-US" dirty="0" err="1"/>
-              <a:t>NaNs</a:t>
-            </a:r>
-            <a:r>
-              <a:rPr lang="en-US" dirty="0"/>
-              <a:t> in the main columns (such as date)</a:t>
-            </a:r>
-          </a:p>
-          <a:p>
-            <a:r>
-              <a:rPr lang="en-US" dirty="0"/>
-              <a:t>Product Category = ‘Books’</a:t>
-            </a:r>
-          </a:p>
-          <a:p>
-            <a:r>
-              <a:rPr lang="en-US" dirty="0"/>
-              <a:t>Handle emojis</a:t>
-            </a:r>
-          </a:p>
-          <a:p>
-            <a:r>
-              <a:rPr lang="en-US" dirty="0"/>
-              <a:t>Remove rows with very short review bodies? </a:t>
-            </a:r>
-          </a:p>
-          <a:p>
-            <a:r>
-              <a:rPr lang="en-US" dirty="0"/>
-              <a:t>Remove rows with review body ‘N/A’ or something similar </a:t>
-            </a:r>
-          </a:p>
-          <a:p>
-            <a:r>
-              <a:rPr lang="en-US" dirty="0"/>
-              <a:t>Only keep verified purchases</a:t>
-            </a:r>
-          </a:p>
-          <a:p>
-            <a:r>
-              <a:rPr lang="en-US" dirty="0"/>
-              <a:t>Clean out bad characters in review body such as breaks/newlines </a:t>
-            </a:r>
-          </a:p>
-          <a:p>
-            <a:r>
-              <a:rPr lang="en-US" dirty="0"/>
-              <a:t>Look at more rows and see if there are any other issues </a:t>
+          <a:bodyPr/>
+          <a:lstStyle/>
+          <a:p>
+            <a:r>
+              <a:rPr lang="en-US" dirty="0"/>
+              <a:t>Background on topic…</a:t>
+            </a:r>
+          </a:p>
+          <a:p>
+            <a:r>
+              <a:rPr lang="en-US" dirty="0"/>
+              <a:t>Basic Problems: 1) reading reviews and predicting number of stars. 2) reading reviews and predicting whether a book will make the top 100 rank for that year</a:t>
             </a:r>
           </a:p>
         </p:txBody>
@@ -4712,7 +4681,7 @@
     </p:spTree>
     <p:extLst>
       <p:ext uri="{BB962C8B-B14F-4D97-AF65-F5344CB8AC3E}">
-        <p14:creationId xmlns:p14="http://schemas.microsoft.com/office/powerpoint/2010/main" val="3110752183"/>
+        <p14:creationId xmlns:p14="http://schemas.microsoft.com/office/powerpoint/2010/main" val="117069465"/>
       </p:ext>
     </p:extLst>
   </p:cSld>
@@ -4744,7 +4713,7 @@
           <p:cNvPr id="2" name="Title 1">
             <a:extLst>
               <a:ext uri="{FF2B5EF4-FFF2-40B4-BE49-F238E27FC236}">
-                <a16:creationId xmlns:a16="http://schemas.microsoft.com/office/drawing/2014/main" id="{2F698E57-B8EA-244B-829C-0A19A808389E}"/>
+                <a16:creationId xmlns:a16="http://schemas.microsoft.com/office/drawing/2014/main" id="{EAC65094-1AD8-784A-9361-19962014DD09}"/>
               </a:ext>
             </a:extLst>
           </p:cNvPr>
@@ -4762,14 +4731,14 @@
           <a:p>
             <a:r>
               <a:rPr lang="en-US" dirty="0"/>
-              <a:t>Book Cleaning – Harder Problems</a:t>
+              <a:t>Book Cleaning– </a:t>
             </a:r>
             <a:br>
               <a:rPr lang="en-US" dirty="0"/>
             </a:br>
             <a:r>
               <a:rPr lang="en-US" dirty="0"/>
-              <a:t>Second pass</a:t>
+              <a:t>First Pass (90% complete)</a:t>
             </a:r>
           </a:p>
         </p:txBody>
@@ -4779,7 +4748,7 @@
           <p:cNvPr id="3" name="Content Placeholder 2">
             <a:extLst>
               <a:ext uri="{FF2B5EF4-FFF2-40B4-BE49-F238E27FC236}">
-                <a16:creationId xmlns:a16="http://schemas.microsoft.com/office/drawing/2014/main" id="{0B965D4A-988D-9145-8374-F4C4923D473A}"/>
+                <a16:creationId xmlns:a16="http://schemas.microsoft.com/office/drawing/2014/main" id="{D9E30147-D50E-9845-AF83-48FDD3D2471F}"/>
               </a:ext>
             </a:extLst>
           </p:cNvPr>
@@ -4792,40 +4761,64 @@
         </p:nvSpPr>
         <p:spPr/>
         <p:txBody>
-          <a:bodyPr/>
-          <a:lstStyle/>
-          <a:p>
-            <a:r>
-              <a:rPr lang="en-US" dirty="0"/>
-              <a:t>Handle the size of the data </a:t>
-            </a:r>
-          </a:p>
-          <a:p>
-            <a:pPr lvl="1"/>
-            <a:r>
-              <a:rPr lang="en-US" dirty="0"/>
-              <a:t>Dataset is 6.7GB (over 10 million rows) so we cannot load it into a </a:t>
+          <a:bodyPr>
+            <a:normAutofit fontScale="92500" lnSpcReduction="20000"/>
+          </a:bodyPr>
+          <a:lstStyle/>
+          <a:p>
+            <a:r>
+              <a:rPr lang="en-US" dirty="0"/>
+              <a:t>Remove rows with </a:t>
             </a:r>
             <a:r>
               <a:rPr lang="en-US" dirty="0" err="1"/>
-              <a:t>Jupyter</a:t>
-            </a:r>
-            <a:r>
-              <a:rPr lang="en-US" dirty="0"/>
-              <a:t> Notebook. </a:t>
-            </a:r>
-          </a:p>
-          <a:p>
-            <a:pPr lvl="1"/>
-            <a:r>
-              <a:rPr lang="en-US" dirty="0"/>
-              <a:t>Going to decide what cleaning we want to do on a smaller set of it then write a python script to clean the whole dataset </a:t>
-            </a:r>
-          </a:p>
-          <a:p>
-            <a:r>
-              <a:rPr lang="en-US" dirty="0"/>
-              <a:t>Remove all books with fewer than N reviews </a:t>
+              <a:t>NaNs</a:t>
+            </a:r>
+            <a:r>
+              <a:rPr lang="en-US" dirty="0"/>
+              <a:t> in the main columns (such as date)</a:t>
+            </a:r>
+          </a:p>
+          <a:p>
+            <a:r>
+              <a:rPr lang="en-US" dirty="0"/>
+              <a:t>Product Category = ‘Books’</a:t>
+            </a:r>
+          </a:p>
+          <a:p>
+            <a:r>
+              <a:rPr lang="en-US" dirty="0"/>
+              <a:t>Handle emojis</a:t>
+            </a:r>
+          </a:p>
+          <a:p>
+            <a:r>
+              <a:rPr lang="en-US" dirty="0"/>
+              <a:t>Remove rows with very short review bodies? </a:t>
+            </a:r>
+          </a:p>
+          <a:p>
+            <a:r>
+              <a:rPr lang="en-US" dirty="0"/>
+              <a:t>Remove rows with review body ‘N/A’ or something similar </a:t>
+            </a:r>
+          </a:p>
+          <a:p>
+            <a:r>
+              <a:rPr lang="en-US" dirty="0"/>
+              <a:t>Only keep verified purchases</a:t>
+            </a:r>
+          </a:p>
+          <a:p>
+            <a:r>
+              <a:rPr lang="en-US" dirty="0"/>
+              <a:t>Clean out bad characters in review body such as breaks/newlines </a:t>
+            </a:r>
+          </a:p>
+          <a:p>
+            <a:r>
+              <a:rPr lang="en-US" dirty="0"/>
+              <a:t>Look at more rows and see if there are any other issues </a:t>
             </a:r>
           </a:p>
         </p:txBody>
@@ -4833,7 +4826,7 @@
     </p:spTree>
     <p:extLst>
       <p:ext uri="{BB962C8B-B14F-4D97-AF65-F5344CB8AC3E}">
-        <p14:creationId xmlns:p14="http://schemas.microsoft.com/office/powerpoint/2010/main" val="87731616"/>
+        <p14:creationId xmlns:p14="http://schemas.microsoft.com/office/powerpoint/2010/main" val="3110752183"/>
       </p:ext>
     </p:extLst>
   </p:cSld>
@@ -4865,7 +4858,7 @@
           <p:cNvPr id="2" name="Title 1">
             <a:extLst>
               <a:ext uri="{FF2B5EF4-FFF2-40B4-BE49-F238E27FC236}">
-                <a16:creationId xmlns:a16="http://schemas.microsoft.com/office/drawing/2014/main" id="{94506ABC-D637-7648-9591-856B74A53350}"/>
+                <a16:creationId xmlns:a16="http://schemas.microsoft.com/office/drawing/2014/main" id="{2F698E57-B8EA-244B-829C-0A19A808389E}"/>
               </a:ext>
             </a:extLst>
           </p:cNvPr>
@@ -4883,7 +4876,14 @@
           <a:p>
             <a:r>
               <a:rPr lang="en-US" dirty="0"/>
-              <a:t>Book Data Plan</a:t>
+              <a:t>Book Cleaning – Harder Problems</a:t>
+            </a:r>
+            <a:br>
+              <a:rPr lang="en-US" dirty="0"/>
+            </a:br>
+            <a:r>
+              <a:rPr lang="en-US" dirty="0"/>
+              <a:t>Second pass (to be completed)</a:t>
             </a:r>
           </a:p>
         </p:txBody>
@@ -4893,7 +4893,7 @@
           <p:cNvPr id="3" name="Content Placeholder 2">
             <a:extLst>
               <a:ext uri="{FF2B5EF4-FFF2-40B4-BE49-F238E27FC236}">
-                <a16:creationId xmlns:a16="http://schemas.microsoft.com/office/drawing/2014/main" id="{5324AC94-475D-414C-92A3-B1CAAFE89714}"/>
+                <a16:creationId xmlns:a16="http://schemas.microsoft.com/office/drawing/2014/main" id="{0B965D4A-988D-9145-8374-F4C4923D473A}"/>
               </a:ext>
             </a:extLst>
           </p:cNvPr>
@@ -4904,88 +4904,50 @@
             <p:ph idx="1"/>
           </p:nvPr>
         </p:nvSpPr>
-        <p:spPr>
-          <a:xfrm>
-            <a:off x="2773599" y="1474470"/>
-            <a:ext cx="7796540" cy="4575474"/>
-          </a:xfrm>
-        </p:spPr>
-        <p:txBody>
-          <a:bodyPr>
-            <a:normAutofit fontScale="85000" lnSpcReduction="10000"/>
-          </a:bodyPr>
-          <a:lstStyle/>
-          <a:p>
-            <a:r>
-              <a:rPr lang="en-US" dirty="0"/>
-              <a:t>Write a Python script that will do the first set of cleaning</a:t>
+        <p:spPr/>
+        <p:txBody>
+          <a:bodyPr/>
+          <a:lstStyle/>
+          <a:p>
+            <a:r>
+              <a:rPr lang="en-US" dirty="0"/>
+              <a:t>Handle the size of the data </a:t>
             </a:r>
           </a:p>
           <a:p>
             <a:pPr lvl="1"/>
             <a:r>
               <a:rPr lang="en-US" dirty="0"/>
-              <a:t>Will go through the 10 million lines and remove lines that are bad and write the clean lines to an output file with only the columns that we care about</a:t>
-            </a:r>
-          </a:p>
-          <a:p>
-            <a:r>
-              <a:rPr lang="en-US" dirty="0"/>
-              <a:t>Write a second Python script that will go through the “cleaned” dataset </a:t>
+              <a:t>Dataset is 6.7GB (over 10 million rows) so we cannot load it into a </a:t>
+            </a:r>
+            <a:r>
+              <a:rPr lang="en-US" dirty="0" err="1"/>
+              <a:t>Jupyter</a:t>
+            </a:r>
+            <a:r>
+              <a:rPr lang="en-US" dirty="0"/>
+              <a:t> Notebook. </a:t>
             </a:r>
           </a:p>
           <a:p>
             <a:pPr lvl="1"/>
             <a:r>
               <a:rPr lang="en-US" dirty="0"/>
-              <a:t>It will build a list of all unique books and the number of reviews for each</a:t>
-            </a:r>
-          </a:p>
-          <a:p>
-            <a:pPr lvl="1"/>
-            <a:r>
-              <a:rPr lang="en-US" dirty="0"/>
-              <a:t>We will need to look at it and decide what is the minimum number of reviews that we want to keep </a:t>
-            </a:r>
-          </a:p>
-          <a:p>
-            <a:r>
-              <a:rPr lang="en-US" dirty="0"/>
-              <a:t>Write a 3</a:t>
-            </a:r>
-            <a:r>
-              <a:rPr lang="en-US" baseline="30000" dirty="0"/>
-              <a:t>rd</a:t>
-            </a:r>
-            <a:r>
-              <a:rPr lang="en-US" dirty="0"/>
-              <a:t> Python script that will go through the “cleaned” dataset and keep the lines with books that have enough reviews</a:t>
-            </a:r>
-          </a:p>
-          <a:p>
-            <a:r>
-              <a:rPr lang="en-US" dirty="0"/>
-              <a:t>After this 3</a:t>
-            </a:r>
-            <a:r>
-              <a:rPr lang="en-US" baseline="30000" dirty="0"/>
-              <a:t>rd</a:t>
-            </a:r>
-            <a:r>
-              <a:rPr lang="en-US" dirty="0"/>
-              <a:t> Python script we expect the dataset to be much smaller and this is what we will work with to compare against our top 100 book dataset and create models/visualizations with </a:t>
-            </a:r>
-          </a:p>
-          <a:p>
-            <a:pPr lvl="1"/>
-            <a:endParaRPr lang="en-US" dirty="0"/>
+              <a:t>Going to decide what cleaning we want to do on a smaller set of it then write a python script to clean the whole dataset </a:t>
+            </a:r>
+          </a:p>
+          <a:p>
+            <a:r>
+              <a:rPr lang="en-US" dirty="0"/>
+              <a:t>Remove all books with fewer than N reviews </a:t>
+            </a:r>
           </a:p>
         </p:txBody>
       </p:sp>
     </p:spTree>
     <p:extLst>
       <p:ext uri="{BB962C8B-B14F-4D97-AF65-F5344CB8AC3E}">
-        <p14:creationId xmlns:p14="http://schemas.microsoft.com/office/powerpoint/2010/main" val="719346614"/>
+        <p14:creationId xmlns:p14="http://schemas.microsoft.com/office/powerpoint/2010/main" val="87731616"/>
       </p:ext>
     </p:extLst>
   </p:cSld>
@@ -5017,7 +4979,7 @@
           <p:cNvPr id="2" name="Title 1">
             <a:extLst>
               <a:ext uri="{FF2B5EF4-FFF2-40B4-BE49-F238E27FC236}">
-                <a16:creationId xmlns:a16="http://schemas.microsoft.com/office/drawing/2014/main" id="{EAC65094-1AD8-784A-9361-19962014DD09}"/>
+                <a16:creationId xmlns:a16="http://schemas.microsoft.com/office/drawing/2014/main" id="{94506ABC-D637-7648-9591-856B74A53350}"/>
               </a:ext>
             </a:extLst>
           </p:cNvPr>
@@ -5035,14 +4997,14 @@
           <a:p>
             <a:r>
               <a:rPr lang="en-US" dirty="0"/>
-              <a:t>Mobile Electronics– </a:t>
+              <a:t>Book Data Plan</a:t>
             </a:r>
             <a:br>
               <a:rPr lang="en-US" dirty="0"/>
             </a:br>
             <a:r>
               <a:rPr lang="en-US" dirty="0"/>
-              <a:t>Completed</a:t>
+              <a:t>(to be completed)</a:t>
             </a:r>
           </a:p>
         </p:txBody>
@@ -5052,7 +5014,7 @@
           <p:cNvPr id="3" name="Content Placeholder 2">
             <a:extLst>
               <a:ext uri="{FF2B5EF4-FFF2-40B4-BE49-F238E27FC236}">
-                <a16:creationId xmlns:a16="http://schemas.microsoft.com/office/drawing/2014/main" id="{D9E30147-D50E-9845-AF83-48FDD3D2471F}"/>
+                <a16:creationId xmlns:a16="http://schemas.microsoft.com/office/drawing/2014/main" id="{5324AC94-475D-414C-92A3-B1CAAFE89714}"/>
               </a:ext>
             </a:extLst>
           </p:cNvPr>
@@ -5063,70 +5025,88 @@
             <p:ph idx="1"/>
           </p:nvPr>
         </p:nvSpPr>
-        <p:spPr/>
+        <p:spPr>
+          <a:xfrm>
+            <a:off x="2773599" y="1885285"/>
+            <a:ext cx="7796540" cy="4575474"/>
+          </a:xfrm>
+        </p:spPr>
         <p:txBody>
           <a:bodyPr>
-            <a:normAutofit/>
+            <a:normAutofit fontScale="85000" lnSpcReduction="10000"/>
           </a:bodyPr>
           <a:lstStyle/>
           <a:p>
             <a:r>
               <a:rPr lang="en-US" dirty="0"/>
-              <a:t>Loaded data from Amazon review repository</a:t>
-            </a:r>
-          </a:p>
-          <a:p>
-            <a:r>
-              <a:rPr lang="en-US" dirty="0"/>
-              <a:t>Removed null values</a:t>
-            </a:r>
-          </a:p>
-          <a:p>
-            <a:r>
-              <a:rPr lang="en-US" dirty="0"/>
-              <a:t>Converted emojis into text</a:t>
-            </a:r>
-          </a:p>
-          <a:p>
-            <a:r>
-              <a:rPr lang="en-US" dirty="0"/>
-              <a:t>Removed products that had less than 30 reviews</a:t>
-            </a:r>
-          </a:p>
-          <a:p>
-            <a:r>
-              <a:rPr lang="en-US" dirty="0"/>
-              <a:t>Very early EDA</a:t>
+              <a:t>Write a Python script that will do the first set of cleaning</a:t>
             </a:r>
           </a:p>
           <a:p>
             <a:pPr lvl="1"/>
             <a:r>
               <a:rPr lang="en-US" dirty="0"/>
-              <a:t>Top products by review / star ratings</a:t>
+              <a:t>Will go through the 10 million lines and remove lines that are bad and write the clean lines to an output file with only the columns that we care about</a:t>
+            </a:r>
+          </a:p>
+          <a:p>
+            <a:r>
+              <a:rPr lang="en-US" dirty="0"/>
+              <a:t>Write a second Python script that will go through the “cleaned” dataset </a:t>
             </a:r>
           </a:p>
           <a:p>
             <a:pPr lvl="1"/>
             <a:r>
               <a:rPr lang="en-US" dirty="0"/>
-              <a:t>Most common words / </a:t>
-            </a:r>
-            <a:r>
-              <a:rPr lang="en-US" dirty="0" err="1"/>
-              <a:t>ngrams</a:t>
-            </a:r>
-            <a:r>
-              <a:rPr lang="en-US" dirty="0"/>
-              <a:t> by star rating</a:t>
-            </a:r>
+              <a:t>It will build a list of all unique books and the number of reviews for each</a:t>
+            </a:r>
+          </a:p>
+          <a:p>
+            <a:pPr lvl="1"/>
+            <a:r>
+              <a:rPr lang="en-US" dirty="0"/>
+              <a:t>We will need to look at it and decide what is the minimum number of reviews that we want to keep </a:t>
+            </a:r>
+          </a:p>
+          <a:p>
+            <a:r>
+              <a:rPr lang="en-US" dirty="0"/>
+              <a:t>Write a 3</a:t>
+            </a:r>
+            <a:r>
+              <a:rPr lang="en-US" baseline="30000" dirty="0"/>
+              <a:t>rd</a:t>
+            </a:r>
+            <a:r>
+              <a:rPr lang="en-US" dirty="0"/>
+              <a:t> Python script that will go through the “cleaned” dataset and keep the lines with books that have enough reviews</a:t>
+            </a:r>
+          </a:p>
+          <a:p>
+            <a:r>
+              <a:rPr lang="en-US" dirty="0"/>
+              <a:t>After this 3</a:t>
+            </a:r>
+            <a:r>
+              <a:rPr lang="en-US" baseline="30000" dirty="0"/>
+              <a:t>rd</a:t>
+            </a:r>
+            <a:r>
+              <a:rPr lang="en-US" dirty="0"/>
+              <a:t> Python script we expect the dataset to be much smaller and this is what we will work with to compare against our top 100 book dataset and create models/visualizations with </a:t>
+            </a:r>
+          </a:p>
+          <a:p>
+            <a:pPr lvl="1"/>
+            <a:endParaRPr lang="en-US" dirty="0"/>
           </a:p>
         </p:txBody>
       </p:sp>
     </p:spTree>
     <p:extLst>
       <p:ext uri="{BB962C8B-B14F-4D97-AF65-F5344CB8AC3E}">
-        <p14:creationId xmlns:p14="http://schemas.microsoft.com/office/powerpoint/2010/main" val="694658502"/>
+        <p14:creationId xmlns:p14="http://schemas.microsoft.com/office/powerpoint/2010/main" val="719346614"/>
       </p:ext>
     </p:extLst>
   </p:cSld>
@@ -5158,6 +5138,252 @@
           <p:cNvPr id="2" name="Title 1">
             <a:extLst>
               <a:ext uri="{FF2B5EF4-FFF2-40B4-BE49-F238E27FC236}">
+                <a16:creationId xmlns:a16="http://schemas.microsoft.com/office/drawing/2014/main" id="{B20A7AAF-7498-4A45-B5B7-EB2C88758E05}"/>
+              </a:ext>
+            </a:extLst>
+          </p:cNvPr>
+          <p:cNvSpPr>
+            <a:spLocks noGrp="1"/>
+          </p:cNvSpPr>
+          <p:nvPr>
+            <p:ph type="title"/>
+          </p:nvPr>
+        </p:nvSpPr>
+        <p:spPr/>
+        <p:txBody>
+          <a:bodyPr/>
+          <a:lstStyle/>
+          <a:p>
+            <a:r>
+              <a:rPr lang="en-US" dirty="0"/>
+              <a:t>Book Review Data vs Top 100 Ranked Books (to be completed)</a:t>
+            </a:r>
+          </a:p>
+        </p:txBody>
+      </p:sp>
+      <p:sp>
+        <p:nvSpPr>
+          <p:cNvPr id="3" name="Content Placeholder 2">
+            <a:extLst>
+              <a:ext uri="{FF2B5EF4-FFF2-40B4-BE49-F238E27FC236}">
+                <a16:creationId xmlns:a16="http://schemas.microsoft.com/office/drawing/2014/main" id="{5B0FC858-7B6B-3E4E-A8F3-4158BC1263CF}"/>
+              </a:ext>
+            </a:extLst>
+          </p:cNvPr>
+          <p:cNvSpPr>
+            <a:spLocks noGrp="1"/>
+          </p:cNvSpPr>
+          <p:nvPr>
+            <p:ph idx="1"/>
+          </p:nvPr>
+        </p:nvSpPr>
+        <p:spPr/>
+        <p:txBody>
+          <a:bodyPr/>
+          <a:lstStyle/>
+          <a:p>
+            <a:r>
+              <a:rPr lang="en-US" dirty="0"/>
+              <a:t>Once the book review data is cleaned as described above we will pull in the top 100 ranked books by year to begin their comparison</a:t>
+            </a:r>
+          </a:p>
+          <a:p>
+            <a:r>
+              <a:rPr lang="en-US" dirty="0"/>
+              <a:t>We don’t expect any issues with cleaning the top 100 ranked books but when we pull the data we may need some simple clean up </a:t>
+            </a:r>
+          </a:p>
+          <a:p>
+            <a:r>
+              <a:rPr lang="en-US" dirty="0"/>
+              <a:t>A possible harder problem is merging the top ranked book list with the book review data </a:t>
+            </a:r>
+          </a:p>
+          <a:p>
+            <a:pPr lvl="1"/>
+            <a:r>
+              <a:rPr lang="en-US" dirty="0"/>
+              <a:t>Book titles may be very close but not identical, issues like that </a:t>
+            </a:r>
+          </a:p>
+        </p:txBody>
+      </p:sp>
+    </p:spTree>
+    <p:extLst>
+      <p:ext uri="{BB962C8B-B14F-4D97-AF65-F5344CB8AC3E}">
+        <p14:creationId xmlns:p14="http://schemas.microsoft.com/office/powerpoint/2010/main" val="831254912"/>
+      </p:ext>
+    </p:extLst>
+  </p:cSld>
+  <p:clrMapOvr>
+    <a:masterClrMapping/>
+  </p:clrMapOvr>
+</p:sld>
+</file>
+
+<file path=ppt/slides/slide7.xml><?xml version="1.0" encoding="utf-8"?>
+<p:sld xmlns:a="http://schemas.openxmlformats.org/drawingml/2006/main" xmlns:r="http://schemas.openxmlformats.org/officeDocument/2006/relationships" xmlns:p="http://schemas.openxmlformats.org/presentationml/2006/main">
+  <p:cSld>
+    <p:spTree>
+      <p:nvGrpSpPr>
+        <p:cNvPr id="1" name=""/>
+        <p:cNvGrpSpPr/>
+        <p:nvPr/>
+      </p:nvGrpSpPr>
+      <p:grpSpPr>
+        <a:xfrm>
+          <a:off x="0" y="0"/>
+          <a:ext cx="0" cy="0"/>
+          <a:chOff x="0" y="0"/>
+          <a:chExt cx="0" cy="0"/>
+        </a:xfrm>
+      </p:grpSpPr>
+      <p:sp>
+        <p:nvSpPr>
+          <p:cNvPr id="2" name="Title 1">
+            <a:extLst>
+              <a:ext uri="{FF2B5EF4-FFF2-40B4-BE49-F238E27FC236}">
+                <a16:creationId xmlns:a16="http://schemas.microsoft.com/office/drawing/2014/main" id="{EAC65094-1AD8-784A-9361-19962014DD09}"/>
+              </a:ext>
+            </a:extLst>
+          </p:cNvPr>
+          <p:cNvSpPr>
+            <a:spLocks noGrp="1"/>
+          </p:cNvSpPr>
+          <p:nvPr>
+            <p:ph type="title"/>
+          </p:nvPr>
+        </p:nvSpPr>
+        <p:spPr/>
+        <p:txBody>
+          <a:bodyPr/>
+          <a:lstStyle/>
+          <a:p>
+            <a:r>
+              <a:rPr lang="en-US" dirty="0"/>
+              <a:t>Mobile Electronics– </a:t>
+            </a:r>
+            <a:br>
+              <a:rPr lang="en-US" dirty="0"/>
+            </a:br>
+            <a:r>
+              <a:rPr lang="en-US" dirty="0"/>
+              <a:t>Completed</a:t>
+            </a:r>
+          </a:p>
+        </p:txBody>
+      </p:sp>
+      <p:sp>
+        <p:nvSpPr>
+          <p:cNvPr id="3" name="Content Placeholder 2">
+            <a:extLst>
+              <a:ext uri="{FF2B5EF4-FFF2-40B4-BE49-F238E27FC236}">
+                <a16:creationId xmlns:a16="http://schemas.microsoft.com/office/drawing/2014/main" id="{D9E30147-D50E-9845-AF83-48FDD3D2471F}"/>
+              </a:ext>
+            </a:extLst>
+          </p:cNvPr>
+          <p:cNvSpPr>
+            <a:spLocks noGrp="1"/>
+          </p:cNvSpPr>
+          <p:nvPr>
+            <p:ph idx="1"/>
+          </p:nvPr>
+        </p:nvSpPr>
+        <p:spPr/>
+        <p:txBody>
+          <a:bodyPr>
+            <a:normAutofit/>
+          </a:bodyPr>
+          <a:lstStyle/>
+          <a:p>
+            <a:r>
+              <a:rPr lang="en-US" dirty="0"/>
+              <a:t>Loaded data from Amazon review repository</a:t>
+            </a:r>
+          </a:p>
+          <a:p>
+            <a:r>
+              <a:rPr lang="en-US" dirty="0"/>
+              <a:t>Removed null values</a:t>
+            </a:r>
+          </a:p>
+          <a:p>
+            <a:r>
+              <a:rPr lang="en-US" dirty="0"/>
+              <a:t>Converted emojis into text</a:t>
+            </a:r>
+          </a:p>
+          <a:p>
+            <a:r>
+              <a:rPr lang="en-US" dirty="0"/>
+              <a:t>Removed products that had less than 30 reviews</a:t>
+            </a:r>
+          </a:p>
+          <a:p>
+            <a:r>
+              <a:rPr lang="en-US" dirty="0"/>
+              <a:t>Very early EDA</a:t>
+            </a:r>
+          </a:p>
+          <a:p>
+            <a:pPr lvl="1"/>
+            <a:r>
+              <a:rPr lang="en-US" dirty="0"/>
+              <a:t>Top products by review / star ratings</a:t>
+            </a:r>
+          </a:p>
+          <a:p>
+            <a:pPr lvl="1"/>
+            <a:r>
+              <a:rPr lang="en-US" dirty="0"/>
+              <a:t>Most common words / </a:t>
+            </a:r>
+            <a:r>
+              <a:rPr lang="en-US" dirty="0" err="1"/>
+              <a:t>ngrams</a:t>
+            </a:r>
+            <a:r>
+              <a:rPr lang="en-US" dirty="0"/>
+              <a:t> by star rating</a:t>
+            </a:r>
+          </a:p>
+        </p:txBody>
+      </p:sp>
+    </p:spTree>
+    <p:extLst>
+      <p:ext uri="{BB962C8B-B14F-4D97-AF65-F5344CB8AC3E}">
+        <p14:creationId xmlns:p14="http://schemas.microsoft.com/office/powerpoint/2010/main" val="694658502"/>
+      </p:ext>
+    </p:extLst>
+  </p:cSld>
+  <p:clrMapOvr>
+    <a:masterClrMapping/>
+  </p:clrMapOvr>
+</p:sld>
+</file>
+
+<file path=ppt/slides/slide8.xml><?xml version="1.0" encoding="utf-8"?>
+<p:sld xmlns:a="http://schemas.openxmlformats.org/drawingml/2006/main" xmlns:r="http://schemas.openxmlformats.org/officeDocument/2006/relationships" xmlns:p="http://schemas.openxmlformats.org/presentationml/2006/main">
+  <p:cSld>
+    <p:spTree>
+      <p:nvGrpSpPr>
+        <p:cNvPr id="1" name=""/>
+        <p:cNvGrpSpPr/>
+        <p:nvPr/>
+      </p:nvGrpSpPr>
+      <p:grpSpPr>
+        <a:xfrm>
+          <a:off x="0" y="0"/>
+          <a:ext cx="0" cy="0"/>
+          <a:chOff x="0" y="0"/>
+          <a:chExt cx="0" cy="0"/>
+        </a:xfrm>
+      </p:grpSpPr>
+      <p:sp>
+        <p:nvSpPr>
+          <p:cNvPr id="2" name="Title 1">
+            <a:extLst>
+              <a:ext uri="{FF2B5EF4-FFF2-40B4-BE49-F238E27FC236}">
                 <a16:creationId xmlns:a16="http://schemas.microsoft.com/office/drawing/2014/main" id="{2F698E57-B8EA-244B-829C-0A19A808389E}"/>
               </a:ext>
             </a:extLst>
@@ -5296,7 +5522,7 @@
 </p:sld>
 </file>
 
-<file path=ppt/slides/slide7.xml><?xml version="1.0" encoding="utf-8"?>
+<file path=ppt/slides/slide9.xml><?xml version="1.0" encoding="utf-8"?>
 <p:sld xmlns:a="http://schemas.openxmlformats.org/drawingml/2006/main" xmlns:r="http://schemas.openxmlformats.org/officeDocument/2006/relationships" xmlns:p="http://schemas.openxmlformats.org/presentationml/2006/main">
   <p:cSld>
     <p:spTree>

</xml_diff>